<commit_message>
Updated slides in Git tutorial
</commit_message>
<xml_diff>
--- a/Git Tutorial/Git Tutorial.pptx
+++ b/Git Tutorial/Git Tutorial.pptx
@@ -33,6 +33,8 @@
     <p:sldId id="283" r:id="rId27"/>
     <p:sldId id="272" r:id="rId28"/>
     <p:sldId id="270" r:id="rId29"/>
+    <p:sldId id="286" r:id="rId30"/>
+    <p:sldId id="285" r:id="rId31"/>
   </p:sldIdLst>
   <p:sldSz cx="12192000" cy="6858000"/>
   <p:notesSz cx="6858000" cy="9144000"/>
@@ -189,7 +191,7 @@
           <a:noFill/>
           <a:extLst>
             <a:ext uri="{909E8E84-426E-40dd-AFC4-6F175D3DCCD1}">
-              <a14:hiddenFill xmlns:a14="http://schemas.microsoft.com/office/drawing/2010/main" xmlns="">
+              <a14:hiddenFill xmlns="" xmlns:a14="http://schemas.microsoft.com/office/drawing/2010/main">
                 <a:solidFill>
                   <a:srgbClr val="FFFFFF"/>
                 </a:solidFill>
@@ -249,7 +251,7 @@
             </a:ln>
             <a:extLst>
               <a:ext uri="{91240B29-F687-4f45-9708-019B960494DF}">
-                <a14:hiddenLine xmlns:a14="http://schemas.microsoft.com/office/drawing/2010/main" xmlns="" w="9525">
+                <a14:hiddenLine xmlns="" xmlns:a14="http://schemas.microsoft.com/office/drawing/2010/main" w="9525">
                   <a:solidFill>
                     <a:srgbClr val="000000"/>
                   </a:solidFill>
@@ -339,7 +341,7 @@
             </a:ln>
             <a:extLst>
               <a:ext uri="{91240B29-F687-4f45-9708-019B960494DF}">
-                <a14:hiddenLine xmlns:a14="http://schemas.microsoft.com/office/drawing/2010/main" xmlns="" w="9525">
+                <a14:hiddenLine xmlns="" xmlns:a14="http://schemas.microsoft.com/office/drawing/2010/main" w="9525">
                   <a:solidFill>
                     <a:srgbClr val="000000"/>
                   </a:solidFill>
@@ -429,7 +431,7 @@
             </a:ln>
             <a:extLst>
               <a:ext uri="{91240B29-F687-4f45-9708-019B960494DF}">
-                <a14:hiddenLine xmlns:a14="http://schemas.microsoft.com/office/drawing/2010/main" xmlns="" w="9525">
+                <a14:hiddenLine xmlns="" xmlns:a14="http://schemas.microsoft.com/office/drawing/2010/main" w="9525">
                   <a:solidFill>
                     <a:srgbClr val="000000"/>
                   </a:solidFill>
@@ -463,7 +465,7 @@
             </a:ln>
             <a:extLst>
               <a:ext uri="{91240B29-F687-4f45-9708-019B960494DF}">
-                <a14:hiddenLine xmlns:a14="http://schemas.microsoft.com/office/drawing/2010/main" xmlns="" w="9525">
+                <a14:hiddenLine xmlns="" xmlns:a14="http://schemas.microsoft.com/office/drawing/2010/main" w="9525">
                   <a:solidFill>
                     <a:srgbClr val="000000"/>
                   </a:solidFill>
@@ -553,7 +555,7 @@
             </a:ln>
             <a:extLst>
               <a:ext uri="{91240B29-F687-4f45-9708-019B960494DF}">
-                <a14:hiddenLine xmlns:a14="http://schemas.microsoft.com/office/drawing/2010/main" xmlns="" w="9525">
+                <a14:hiddenLine xmlns="" xmlns:a14="http://schemas.microsoft.com/office/drawing/2010/main" w="9525">
                   <a:solidFill>
                     <a:srgbClr val="000000"/>
                   </a:solidFill>
@@ -615,7 +617,7 @@
             </a:ln>
             <a:extLst>
               <a:ext uri="{91240B29-F687-4f45-9708-019B960494DF}">
-                <a14:hiddenLine xmlns:a14="http://schemas.microsoft.com/office/drawing/2010/main" xmlns="" w="9525">
+                <a14:hiddenLine xmlns="" xmlns:a14="http://schemas.microsoft.com/office/drawing/2010/main" w="9525">
                   <a:solidFill>
                     <a:srgbClr val="000000"/>
                   </a:solidFill>
@@ -677,7 +679,7 @@
             </a:ln>
             <a:extLst>
               <a:ext uri="{91240B29-F687-4f45-9708-019B960494DF}">
-                <a14:hiddenLine xmlns:a14="http://schemas.microsoft.com/office/drawing/2010/main" xmlns="" w="9525">
+                <a14:hiddenLine xmlns="" xmlns:a14="http://schemas.microsoft.com/office/drawing/2010/main" w="9525">
                   <a:solidFill>
                     <a:srgbClr val="000000"/>
                   </a:solidFill>
@@ -767,7 +769,7 @@
             </a:ln>
             <a:extLst>
               <a:ext uri="{91240B29-F687-4f45-9708-019B960494DF}">
-                <a14:hiddenLine xmlns:a14="http://schemas.microsoft.com/office/drawing/2010/main" xmlns="" w="9525">
+                <a14:hiddenLine xmlns="" xmlns:a14="http://schemas.microsoft.com/office/drawing/2010/main" w="9525">
                   <a:solidFill>
                     <a:srgbClr val="000000"/>
                   </a:solidFill>
@@ -829,7 +831,7 @@
             </a:ln>
             <a:extLst>
               <a:ext uri="{91240B29-F687-4f45-9708-019B960494DF}">
-                <a14:hiddenLine xmlns:a14="http://schemas.microsoft.com/office/drawing/2010/main" xmlns="" w="9525">
+                <a14:hiddenLine xmlns="" xmlns:a14="http://schemas.microsoft.com/office/drawing/2010/main" w="9525">
                   <a:solidFill>
                     <a:srgbClr val="000000"/>
                   </a:solidFill>
@@ -891,7 +893,7 @@
             </a:ln>
             <a:extLst>
               <a:ext uri="{91240B29-F687-4f45-9708-019B960494DF}">
-                <a14:hiddenLine xmlns:a14="http://schemas.microsoft.com/office/drawing/2010/main" xmlns="" w="9525">
+                <a14:hiddenLine xmlns="" xmlns:a14="http://schemas.microsoft.com/office/drawing/2010/main" w="9525">
                   <a:solidFill>
                     <a:srgbClr val="000000"/>
                   </a:solidFill>
@@ -981,7 +983,7 @@
             </a:ln>
             <a:extLst>
               <a:ext uri="{91240B29-F687-4f45-9708-019B960494DF}">
-                <a14:hiddenLine xmlns:a14="http://schemas.microsoft.com/office/drawing/2010/main" xmlns="" w="9525">
+                <a14:hiddenLine xmlns="" xmlns:a14="http://schemas.microsoft.com/office/drawing/2010/main" w="9525">
                   <a:solidFill>
                     <a:srgbClr val="000000"/>
                   </a:solidFill>
@@ -1071,7 +1073,7 @@
             </a:ln>
             <a:extLst>
               <a:ext uri="{91240B29-F687-4f45-9708-019B960494DF}">
-                <a14:hiddenLine xmlns:a14="http://schemas.microsoft.com/office/drawing/2010/main" xmlns="" w="9525">
+                <a14:hiddenLine xmlns="" xmlns:a14="http://schemas.microsoft.com/office/drawing/2010/main" w="9525">
                   <a:solidFill>
                     <a:srgbClr val="000000"/>
                   </a:solidFill>
@@ -1133,7 +1135,7 @@
             </a:ln>
             <a:extLst>
               <a:ext uri="{91240B29-F687-4f45-9708-019B960494DF}">
-                <a14:hiddenLine xmlns:a14="http://schemas.microsoft.com/office/drawing/2010/main" xmlns="" w="9525">
+                <a14:hiddenLine xmlns="" xmlns:a14="http://schemas.microsoft.com/office/drawing/2010/main" w="9525">
                   <a:solidFill>
                     <a:srgbClr val="000000"/>
                   </a:solidFill>
@@ -1243,7 +1245,7 @@
             </a:ln>
             <a:extLst>
               <a:ext uri="{91240B29-F687-4f45-9708-019B960494DF}">
-                <a14:hiddenLine xmlns:a14="http://schemas.microsoft.com/office/drawing/2010/main" xmlns="" w="9525">
+                <a14:hiddenLine xmlns="" xmlns:a14="http://schemas.microsoft.com/office/drawing/2010/main" w="9525">
                   <a:solidFill>
                     <a:srgbClr val="000000"/>
                   </a:solidFill>
@@ -1305,7 +1307,7 @@
             </a:ln>
             <a:extLst>
               <a:ext uri="{91240B29-F687-4f45-9708-019B960494DF}">
-                <a14:hiddenLine xmlns:a14="http://schemas.microsoft.com/office/drawing/2010/main" xmlns="" w="9525">
+                <a14:hiddenLine xmlns="" xmlns:a14="http://schemas.microsoft.com/office/drawing/2010/main" w="9525">
                   <a:solidFill>
                     <a:srgbClr val="000000"/>
                   </a:solidFill>
@@ -1395,7 +1397,7 @@
             </a:ln>
             <a:extLst>
               <a:ext uri="{91240B29-F687-4f45-9708-019B960494DF}">
-                <a14:hiddenLine xmlns:a14="http://schemas.microsoft.com/office/drawing/2010/main" xmlns="" w="9525">
+                <a14:hiddenLine xmlns="" xmlns:a14="http://schemas.microsoft.com/office/drawing/2010/main" w="9525">
                   <a:solidFill>
                     <a:srgbClr val="000000"/>
                   </a:solidFill>
@@ -1485,7 +1487,7 @@
             </a:ln>
             <a:extLst>
               <a:ext uri="{91240B29-F687-4f45-9708-019B960494DF}">
-                <a14:hiddenLine xmlns:a14="http://schemas.microsoft.com/office/drawing/2010/main" xmlns="" w="9525">
+                <a14:hiddenLine xmlns="" xmlns:a14="http://schemas.microsoft.com/office/drawing/2010/main" w="9525">
                   <a:solidFill>
                     <a:srgbClr val="000000"/>
                   </a:solidFill>
@@ -1547,7 +1549,7 @@
             </a:ln>
             <a:extLst>
               <a:ext uri="{91240B29-F687-4f45-9708-019B960494DF}">
-                <a14:hiddenLine xmlns:a14="http://schemas.microsoft.com/office/drawing/2010/main" xmlns="" w="9525">
+                <a14:hiddenLine xmlns="" xmlns:a14="http://schemas.microsoft.com/office/drawing/2010/main" w="9525">
                   <a:solidFill>
                     <a:srgbClr val="000000"/>
                   </a:solidFill>
@@ -1637,7 +1639,7 @@
             </a:ln>
             <a:extLst>
               <a:ext uri="{91240B29-F687-4f45-9708-019B960494DF}">
-                <a14:hiddenLine xmlns:a14="http://schemas.microsoft.com/office/drawing/2010/main" xmlns="" w="9525">
+                <a14:hiddenLine xmlns="" xmlns:a14="http://schemas.microsoft.com/office/drawing/2010/main" w="9525">
                   <a:solidFill>
                     <a:srgbClr val="000000"/>
                   </a:solidFill>
@@ -1727,7 +1729,7 @@
             </a:ln>
             <a:extLst>
               <a:ext uri="{91240B29-F687-4f45-9708-019B960494DF}">
-                <a14:hiddenLine xmlns:a14="http://schemas.microsoft.com/office/drawing/2010/main" xmlns="" w="9525">
+                <a14:hiddenLine xmlns="" xmlns:a14="http://schemas.microsoft.com/office/drawing/2010/main" w="9525">
                   <a:solidFill>
                     <a:srgbClr val="000000"/>
                   </a:solidFill>
@@ -1783,7 +1785,7 @@
             </a:ln>
             <a:extLst>
               <a:ext uri="{91240B29-F687-4f45-9708-019B960494DF}">
-                <a14:hiddenLine xmlns:a14="http://schemas.microsoft.com/office/drawing/2010/main" xmlns="" w="9525">
+                <a14:hiddenLine xmlns="" xmlns:a14="http://schemas.microsoft.com/office/drawing/2010/main" w="9525">
                   <a:solidFill>
                     <a:srgbClr val="000000"/>
                   </a:solidFill>
@@ -1873,7 +1875,7 @@
             </a:ln>
             <a:extLst>
               <a:ext uri="{91240B29-F687-4f45-9708-019B960494DF}">
-                <a14:hiddenLine xmlns:a14="http://schemas.microsoft.com/office/drawing/2010/main" xmlns="" w="9525">
+                <a14:hiddenLine xmlns="" xmlns:a14="http://schemas.microsoft.com/office/drawing/2010/main" w="9525">
                   <a:solidFill>
                     <a:srgbClr val="000000"/>
                   </a:solidFill>
@@ -1929,7 +1931,7 @@
             </a:ln>
             <a:extLst>
               <a:ext uri="{91240B29-F687-4f45-9708-019B960494DF}">
-                <a14:hiddenLine xmlns:a14="http://schemas.microsoft.com/office/drawing/2010/main" xmlns="" w="9525">
+                <a14:hiddenLine xmlns="" xmlns:a14="http://schemas.microsoft.com/office/drawing/2010/main" w="9525">
                   <a:solidFill>
                     <a:srgbClr val="000000"/>
                   </a:solidFill>
@@ -2019,7 +2021,7 @@
             </a:ln>
             <a:extLst>
               <a:ext uri="{91240B29-F687-4f45-9708-019B960494DF}">
-                <a14:hiddenLine xmlns:a14="http://schemas.microsoft.com/office/drawing/2010/main" xmlns="" w="9525">
+                <a14:hiddenLine xmlns="" xmlns:a14="http://schemas.microsoft.com/office/drawing/2010/main" w="9525">
                   <a:solidFill>
                     <a:srgbClr val="000000"/>
                   </a:solidFill>
@@ -2087,7 +2089,7 @@
             </a:ln>
             <a:extLst>
               <a:ext uri="{91240B29-F687-4f45-9708-019B960494DF}">
-                <a14:hiddenLine xmlns:a14="http://schemas.microsoft.com/office/drawing/2010/main" xmlns="" w="9525">
+                <a14:hiddenLine xmlns="" xmlns:a14="http://schemas.microsoft.com/office/drawing/2010/main" w="9525">
                   <a:solidFill>
                     <a:srgbClr val="000000"/>
                   </a:solidFill>
@@ -2177,7 +2179,7 @@
             </a:ln>
             <a:extLst>
               <a:ext uri="{91240B29-F687-4f45-9708-019B960494DF}">
-                <a14:hiddenLine xmlns:a14="http://schemas.microsoft.com/office/drawing/2010/main" xmlns="" w="9525">
+                <a14:hiddenLine xmlns="" xmlns:a14="http://schemas.microsoft.com/office/drawing/2010/main" w="9525">
                   <a:solidFill>
                     <a:srgbClr val="000000"/>
                   </a:solidFill>
@@ -2245,7 +2247,7 @@
             </a:ln>
             <a:extLst>
               <a:ext uri="{91240B29-F687-4f45-9708-019B960494DF}">
-                <a14:hiddenLine xmlns:a14="http://schemas.microsoft.com/office/drawing/2010/main" xmlns="" w="9525">
+                <a14:hiddenLine xmlns="" xmlns:a14="http://schemas.microsoft.com/office/drawing/2010/main" w="9525">
                   <a:solidFill>
                     <a:srgbClr val="000000"/>
                   </a:solidFill>
@@ -2335,7 +2337,7 @@
             </a:ln>
             <a:extLst>
               <a:ext uri="{91240B29-F687-4f45-9708-019B960494DF}">
-                <a14:hiddenLine xmlns:a14="http://schemas.microsoft.com/office/drawing/2010/main" xmlns="" w="9525">
+                <a14:hiddenLine xmlns="" xmlns:a14="http://schemas.microsoft.com/office/drawing/2010/main" w="9525">
                   <a:solidFill>
                     <a:srgbClr val="000000"/>
                   </a:solidFill>
@@ -2369,7 +2371,7 @@
             </a:ln>
             <a:extLst>
               <a:ext uri="{91240B29-F687-4f45-9708-019B960494DF}">
-                <a14:hiddenLine xmlns:a14="http://schemas.microsoft.com/office/drawing/2010/main" xmlns="" w="9525">
+                <a14:hiddenLine xmlns="" xmlns:a14="http://schemas.microsoft.com/office/drawing/2010/main" w="9525">
                   <a:solidFill>
                     <a:srgbClr val="000000"/>
                   </a:solidFill>
@@ -2459,7 +2461,7 @@
             </a:ln>
             <a:extLst>
               <a:ext uri="{91240B29-F687-4f45-9708-019B960494DF}">
-                <a14:hiddenLine xmlns:a14="http://schemas.microsoft.com/office/drawing/2010/main" xmlns="" w="9525">
+                <a14:hiddenLine xmlns="" xmlns:a14="http://schemas.microsoft.com/office/drawing/2010/main" w="9525">
                   <a:solidFill>
                     <a:srgbClr val="000000"/>
                   </a:solidFill>
@@ -2521,7 +2523,7 @@
             </a:ln>
             <a:extLst>
               <a:ext uri="{91240B29-F687-4f45-9708-019B960494DF}">
-                <a14:hiddenLine xmlns:a14="http://schemas.microsoft.com/office/drawing/2010/main" xmlns="" w="9525">
+                <a14:hiddenLine xmlns="" xmlns:a14="http://schemas.microsoft.com/office/drawing/2010/main" w="9525">
                   <a:solidFill>
                     <a:srgbClr val="000000"/>
                   </a:solidFill>
@@ -2583,7 +2585,7 @@
             </a:ln>
             <a:extLst>
               <a:ext uri="{91240B29-F687-4f45-9708-019B960494DF}">
-                <a14:hiddenLine xmlns:a14="http://schemas.microsoft.com/office/drawing/2010/main" xmlns="" w="9525">
+                <a14:hiddenLine xmlns="" xmlns:a14="http://schemas.microsoft.com/office/drawing/2010/main" w="9525">
                   <a:solidFill>
                     <a:srgbClr val="000000"/>
                   </a:solidFill>
@@ -2673,7 +2675,7 @@
             </a:ln>
             <a:extLst>
               <a:ext uri="{91240B29-F687-4f45-9708-019B960494DF}">
-                <a14:hiddenLine xmlns:a14="http://schemas.microsoft.com/office/drawing/2010/main" xmlns="" w="9525">
+                <a14:hiddenLine xmlns="" xmlns:a14="http://schemas.microsoft.com/office/drawing/2010/main" w="9525">
                   <a:solidFill>
                     <a:srgbClr val="000000"/>
                   </a:solidFill>
@@ -2741,7 +2743,7 @@
             </a:ln>
             <a:extLst>
               <a:ext uri="{91240B29-F687-4f45-9708-019B960494DF}">
-                <a14:hiddenLine xmlns:a14="http://schemas.microsoft.com/office/drawing/2010/main" xmlns="" w="9525">
+                <a14:hiddenLine xmlns="" xmlns:a14="http://schemas.microsoft.com/office/drawing/2010/main" w="9525">
                   <a:solidFill>
                     <a:srgbClr val="000000"/>
                   </a:solidFill>
@@ -2803,7 +2805,7 @@
             </a:ln>
             <a:extLst>
               <a:ext uri="{91240B29-F687-4f45-9708-019B960494DF}">
-                <a14:hiddenLine xmlns:a14="http://schemas.microsoft.com/office/drawing/2010/main" xmlns="" w="9525">
+                <a14:hiddenLine xmlns="" xmlns:a14="http://schemas.microsoft.com/office/drawing/2010/main" w="9525">
                   <a:solidFill>
                     <a:srgbClr val="000000"/>
                   </a:solidFill>
@@ -2893,7 +2895,7 @@
             </a:ln>
             <a:extLst>
               <a:ext uri="{91240B29-F687-4f45-9708-019B960494DF}">
-                <a14:hiddenLine xmlns:a14="http://schemas.microsoft.com/office/drawing/2010/main" xmlns="" w="9525">
+                <a14:hiddenLine xmlns="" xmlns:a14="http://schemas.microsoft.com/office/drawing/2010/main" w="9525">
                   <a:solidFill>
                     <a:srgbClr val="000000"/>
                   </a:solidFill>
@@ -2955,7 +2957,7 @@
             </a:ln>
             <a:extLst>
               <a:ext uri="{91240B29-F687-4f45-9708-019B960494DF}">
-                <a14:hiddenLine xmlns:a14="http://schemas.microsoft.com/office/drawing/2010/main" xmlns="" w="9525">
+                <a14:hiddenLine xmlns="" xmlns:a14="http://schemas.microsoft.com/office/drawing/2010/main" w="9525">
                   <a:solidFill>
                     <a:srgbClr val="000000"/>
                   </a:solidFill>
@@ -3045,7 +3047,7 @@
             </a:ln>
             <a:extLst>
               <a:ext uri="{91240B29-F687-4f45-9708-019B960494DF}">
-                <a14:hiddenLine xmlns:a14="http://schemas.microsoft.com/office/drawing/2010/main" xmlns="" w="9525">
+                <a14:hiddenLine xmlns="" xmlns:a14="http://schemas.microsoft.com/office/drawing/2010/main" w="9525">
                   <a:solidFill>
                     <a:srgbClr val="000000"/>
                   </a:solidFill>
@@ -3107,7 +3109,7 @@
             </a:ln>
             <a:extLst>
               <a:ext uri="{91240B29-F687-4f45-9708-019B960494DF}">
-                <a14:hiddenLine xmlns:a14="http://schemas.microsoft.com/office/drawing/2010/main" xmlns="" w="9525">
+                <a14:hiddenLine xmlns="" xmlns:a14="http://schemas.microsoft.com/office/drawing/2010/main" w="9525">
                   <a:solidFill>
                     <a:srgbClr val="000000"/>
                   </a:solidFill>
@@ -3197,7 +3199,7 @@
             </a:ln>
             <a:extLst>
               <a:ext uri="{91240B29-F687-4f45-9708-019B960494DF}">
-                <a14:hiddenLine xmlns:a14="http://schemas.microsoft.com/office/drawing/2010/main" xmlns="" w="9525">
+                <a14:hiddenLine xmlns="" xmlns:a14="http://schemas.microsoft.com/office/drawing/2010/main" w="9525">
                   <a:solidFill>
                     <a:srgbClr val="000000"/>
                   </a:solidFill>
@@ -3231,7 +3233,7 @@
             </a:ln>
             <a:extLst>
               <a:ext uri="{91240B29-F687-4f45-9708-019B960494DF}">
-                <a14:hiddenLine xmlns:a14="http://schemas.microsoft.com/office/drawing/2010/main" xmlns="" w="9525">
+                <a14:hiddenLine xmlns="" xmlns:a14="http://schemas.microsoft.com/office/drawing/2010/main" w="9525">
                   <a:solidFill>
                     <a:srgbClr val="000000"/>
                   </a:solidFill>
@@ -3296,7 +3298,7 @@
             </a:ln>
             <a:extLst>
               <a:ext uri="{91240B29-F687-4f45-9708-019B960494DF}">
-                <a14:hiddenLine xmlns:a14="http://schemas.microsoft.com/office/drawing/2010/main" xmlns="" w="9525">
+                <a14:hiddenLine xmlns="" xmlns:a14="http://schemas.microsoft.com/office/drawing/2010/main" w="9525">
                   <a:solidFill>
                     <a:srgbClr val="000000"/>
                   </a:solidFill>
@@ -3386,7 +3388,7 @@
             </a:ln>
             <a:extLst>
               <a:ext uri="{91240B29-F687-4f45-9708-019B960494DF}">
-                <a14:hiddenLine xmlns:a14="http://schemas.microsoft.com/office/drawing/2010/main" xmlns="" w="9525">
+                <a14:hiddenLine xmlns="" xmlns:a14="http://schemas.microsoft.com/office/drawing/2010/main" w="9525">
                   <a:solidFill>
                     <a:srgbClr val="000000"/>
                   </a:solidFill>
@@ -3448,7 +3450,7 @@
             </a:ln>
             <a:extLst>
               <a:ext uri="{91240B29-F687-4f45-9708-019B960494DF}">
-                <a14:hiddenLine xmlns:a14="http://schemas.microsoft.com/office/drawing/2010/main" xmlns="" w="9525">
+                <a14:hiddenLine xmlns="" xmlns:a14="http://schemas.microsoft.com/office/drawing/2010/main" w="9525">
                   <a:solidFill>
                     <a:srgbClr val="000000"/>
                   </a:solidFill>
@@ -3538,7 +3540,7 @@
             </a:ln>
             <a:extLst>
               <a:ext uri="{91240B29-F687-4f45-9708-019B960494DF}">
-                <a14:hiddenLine xmlns:a14="http://schemas.microsoft.com/office/drawing/2010/main" xmlns="" w="9525">
+                <a14:hiddenLine xmlns="" xmlns:a14="http://schemas.microsoft.com/office/drawing/2010/main" w="9525">
                   <a:solidFill>
                     <a:srgbClr val="000000"/>
                   </a:solidFill>
@@ -3628,7 +3630,7 @@
             </a:ln>
             <a:extLst>
               <a:ext uri="{91240B29-F687-4f45-9708-019B960494DF}">
-                <a14:hiddenLine xmlns:a14="http://schemas.microsoft.com/office/drawing/2010/main" xmlns="" w="9525">
+                <a14:hiddenLine xmlns="" xmlns:a14="http://schemas.microsoft.com/office/drawing/2010/main" w="9525">
                   <a:solidFill>
                     <a:srgbClr val="000000"/>
                   </a:solidFill>
@@ -3693,7 +3695,7 @@
             </a:ln>
             <a:extLst>
               <a:ext uri="{91240B29-F687-4f45-9708-019B960494DF}">
-                <a14:hiddenLine xmlns:a14="http://schemas.microsoft.com/office/drawing/2010/main" xmlns="" w="9525">
+                <a14:hiddenLine xmlns="" xmlns:a14="http://schemas.microsoft.com/office/drawing/2010/main" w="9525">
                   <a:solidFill>
                     <a:srgbClr val="000000"/>
                   </a:solidFill>
@@ -3755,7 +3757,7 @@
             </a:ln>
             <a:extLst>
               <a:ext uri="{91240B29-F687-4f45-9708-019B960494DF}">
-                <a14:hiddenLine xmlns:a14="http://schemas.microsoft.com/office/drawing/2010/main" xmlns="" w="9525">
+                <a14:hiddenLine xmlns="" xmlns:a14="http://schemas.microsoft.com/office/drawing/2010/main" w="9525">
                   <a:solidFill>
                     <a:srgbClr val="000000"/>
                   </a:solidFill>
@@ -3845,7 +3847,7 @@
             </a:ln>
             <a:extLst>
               <a:ext uri="{91240B29-F687-4f45-9708-019B960494DF}">
-                <a14:hiddenLine xmlns:a14="http://schemas.microsoft.com/office/drawing/2010/main" xmlns="" w="9525">
+                <a14:hiddenLine xmlns="" xmlns:a14="http://schemas.microsoft.com/office/drawing/2010/main" w="9525">
                   <a:solidFill>
                     <a:srgbClr val="000000"/>
                   </a:solidFill>
@@ -3935,7 +3937,7 @@
             </a:ln>
             <a:extLst>
               <a:ext uri="{91240B29-F687-4f45-9708-019B960494DF}">
-                <a14:hiddenLine xmlns:a14="http://schemas.microsoft.com/office/drawing/2010/main" xmlns="" w="9525">
+                <a14:hiddenLine xmlns="" xmlns:a14="http://schemas.microsoft.com/office/drawing/2010/main" w="9525">
                   <a:solidFill>
                     <a:srgbClr val="000000"/>
                   </a:solidFill>
@@ -3997,7 +3999,7 @@
             </a:ln>
             <a:extLst>
               <a:ext uri="{91240B29-F687-4f45-9708-019B960494DF}">
-                <a14:hiddenLine xmlns:a14="http://schemas.microsoft.com/office/drawing/2010/main" xmlns="" w="9525">
+                <a14:hiddenLine xmlns="" xmlns:a14="http://schemas.microsoft.com/office/drawing/2010/main" w="9525">
                   <a:solidFill>
                     <a:srgbClr val="000000"/>
                   </a:solidFill>
@@ -4117,7 +4119,7 @@
             </a:ln>
             <a:extLst>
               <a:ext uri="{91240B29-F687-4f45-9708-019B960494DF}">
-                <a14:hiddenLine xmlns:a14="http://schemas.microsoft.com/office/drawing/2010/main" xmlns="" w="9525">
+                <a14:hiddenLine xmlns="" xmlns:a14="http://schemas.microsoft.com/office/drawing/2010/main" w="9525">
                   <a:solidFill>
                     <a:srgbClr val="000000"/>
                   </a:solidFill>
@@ -4185,7 +4187,7 @@
             </a:ln>
             <a:extLst>
               <a:ext uri="{91240B29-F687-4f45-9708-019B960494DF}">
-                <a14:hiddenLine xmlns:a14="http://schemas.microsoft.com/office/drawing/2010/main" xmlns="" w="9525">
+                <a14:hiddenLine xmlns="" xmlns:a14="http://schemas.microsoft.com/office/drawing/2010/main" w="9525">
                   <a:solidFill>
                     <a:srgbClr val="000000"/>
                   </a:solidFill>
@@ -4275,7 +4277,7 @@
             </a:ln>
             <a:extLst>
               <a:ext uri="{91240B29-F687-4f45-9708-019B960494DF}">
-                <a14:hiddenLine xmlns:a14="http://schemas.microsoft.com/office/drawing/2010/main" xmlns="" w="9525">
+                <a14:hiddenLine xmlns="" xmlns:a14="http://schemas.microsoft.com/office/drawing/2010/main" w="9525">
                   <a:solidFill>
                     <a:srgbClr val="000000"/>
                   </a:solidFill>
@@ -4415,7 +4417,7 @@
           <a:p>
             <a:fld id="{48A87A34-81AB-432B-8DAE-1953F412C126}" type="datetimeFigureOut">
               <a:rPr lang="en-US" dirty="0"/>
-              <a:t>10/1/2019</a:t>
+              <a:t>10/2/2019</a:t>
             </a:fld>
             <a:endParaRPr lang="en-US" dirty="0"/>
           </a:p>
@@ -4677,7 +4679,7 @@
           <a:p>
             <a:fld id="{48A87A34-81AB-432B-8DAE-1953F412C126}" type="datetimeFigureOut">
               <a:rPr lang="en-US" dirty="0"/>
-              <a:t>10/1/2019</a:t>
+              <a:t>10/2/2019</a:t>
             </a:fld>
             <a:endParaRPr lang="en-US" dirty="0"/>
           </a:p>
@@ -4868,7 +4870,7 @@
           <a:p>
             <a:fld id="{48A87A34-81AB-432B-8DAE-1953F412C126}" type="datetimeFigureOut">
               <a:rPr lang="en-US" dirty="0"/>
-              <a:t>10/1/2019</a:t>
+              <a:t>10/2/2019</a:t>
             </a:fld>
             <a:endParaRPr lang="en-US" dirty="0"/>
           </a:p>
@@ -5126,7 +5128,7 @@
           <a:p>
             <a:fld id="{48A87A34-81AB-432B-8DAE-1953F412C126}" type="datetimeFigureOut">
               <a:rPr lang="en-US" dirty="0"/>
-              <a:t>10/1/2019</a:t>
+              <a:t>10/2/2019</a:t>
             </a:fld>
             <a:endParaRPr lang="en-US" dirty="0"/>
           </a:p>
@@ -5555,7 +5557,7 @@
           <a:p>
             <a:fld id="{48A87A34-81AB-432B-8DAE-1953F412C126}" type="datetimeFigureOut">
               <a:rPr lang="en-US" dirty="0"/>
-              <a:t>10/1/2019</a:t>
+              <a:t>10/2/2019</a:t>
             </a:fld>
             <a:endParaRPr lang="en-US" dirty="0"/>
           </a:p>
@@ -6096,7 +6098,7 @@
           <a:p>
             <a:fld id="{48A87A34-81AB-432B-8DAE-1953F412C126}" type="datetimeFigureOut">
               <a:rPr lang="en-US" dirty="0"/>
-              <a:t>10/1/2019</a:t>
+              <a:t>10/2/2019</a:t>
             </a:fld>
             <a:endParaRPr lang="en-US" dirty="0"/>
           </a:p>
@@ -6811,7 +6813,7 @@
           <a:p>
             <a:fld id="{48A87A34-81AB-432B-8DAE-1953F412C126}" type="datetimeFigureOut">
               <a:rPr lang="en-US" dirty="0"/>
-              <a:t>10/1/2019</a:t>
+              <a:t>10/2/2019</a:t>
             </a:fld>
             <a:endParaRPr lang="en-US" dirty="0"/>
           </a:p>
@@ -6976,7 +6978,7 @@
           <a:p>
             <a:fld id="{48A87A34-81AB-432B-8DAE-1953F412C126}" type="datetimeFigureOut">
               <a:rPr lang="en-US" dirty="0"/>
-              <a:t>10/1/2019</a:t>
+              <a:t>10/2/2019</a:t>
             </a:fld>
             <a:endParaRPr lang="en-US" dirty="0"/>
           </a:p>
@@ -7151,7 +7153,7 @@
           <a:p>
             <a:fld id="{48A87A34-81AB-432B-8DAE-1953F412C126}" type="datetimeFigureOut">
               <a:rPr lang="en-US" dirty="0"/>
-              <a:t>10/1/2019</a:t>
+              <a:t>10/2/2019</a:t>
             </a:fld>
             <a:endParaRPr lang="en-US" dirty="0"/>
           </a:p>
@@ -7316,7 +7318,7 @@
           <a:p>
             <a:fld id="{48A87A34-81AB-432B-8DAE-1953F412C126}" type="datetimeFigureOut">
               <a:rPr lang="en-US" dirty="0"/>
-              <a:t>10/1/2019</a:t>
+              <a:t>10/2/2019</a:t>
             </a:fld>
             <a:endParaRPr lang="en-US" dirty="0"/>
           </a:p>
@@ -7561,7 +7563,7 @@
           <a:p>
             <a:fld id="{48A87A34-81AB-432B-8DAE-1953F412C126}" type="datetimeFigureOut">
               <a:rPr lang="en-US" dirty="0"/>
-              <a:t>10/1/2019</a:t>
+              <a:t>10/2/2019</a:t>
             </a:fld>
             <a:endParaRPr lang="en-US" dirty="0"/>
           </a:p>
@@ -7788,7 +7790,7 @@
           <a:p>
             <a:fld id="{48A87A34-81AB-432B-8DAE-1953F412C126}" type="datetimeFigureOut">
               <a:rPr lang="en-US" dirty="0"/>
-              <a:t>10/1/2019</a:t>
+              <a:t>10/2/2019</a:t>
             </a:fld>
             <a:endParaRPr lang="en-US" dirty="0"/>
           </a:p>
@@ -8164,7 +8166,7 @@
           <a:p>
             <a:fld id="{48A87A34-81AB-432B-8DAE-1953F412C126}" type="datetimeFigureOut">
               <a:rPr lang="en-US" dirty="0"/>
-              <a:t>10/1/2019</a:t>
+              <a:t>10/2/2019</a:t>
             </a:fld>
             <a:endParaRPr lang="en-US" dirty="0"/>
           </a:p>
@@ -8277,7 +8279,7 @@
           <a:p>
             <a:fld id="{48A87A34-81AB-432B-8DAE-1953F412C126}" type="datetimeFigureOut">
               <a:rPr lang="en-US" dirty="0"/>
-              <a:t>10/1/2019</a:t>
+              <a:t>10/2/2019</a:t>
             </a:fld>
             <a:endParaRPr lang="en-US" dirty="0"/>
           </a:p>
@@ -8367,7 +8369,7 @@
           <a:p>
             <a:fld id="{48A87A34-81AB-432B-8DAE-1953F412C126}" type="datetimeFigureOut">
               <a:rPr lang="en-US" dirty="0"/>
-              <a:t>10/1/2019</a:t>
+              <a:t>10/2/2019</a:t>
             </a:fld>
             <a:endParaRPr lang="en-US" dirty="0"/>
           </a:p>
@@ -8611,7 +8613,7 @@
           <a:p>
             <a:fld id="{48A87A34-81AB-432B-8DAE-1953F412C126}" type="datetimeFigureOut">
               <a:rPr lang="en-US" dirty="0"/>
-              <a:t>10/1/2019</a:t>
+              <a:t>10/2/2019</a:t>
             </a:fld>
             <a:endParaRPr lang="en-US" dirty="0"/>
           </a:p>
@@ -8886,7 +8888,7 @@
           <a:p>
             <a:fld id="{48A87A34-81AB-432B-8DAE-1953F412C126}" type="datetimeFigureOut">
               <a:rPr lang="en-US" dirty="0"/>
-              <a:t>10/1/2019</a:t>
+              <a:t>10/2/2019</a:t>
             </a:fld>
             <a:endParaRPr lang="en-US" dirty="0"/>
           </a:p>
@@ -8997,7 +8999,7 @@
           <a:noFill/>
           <a:extLst>
             <a:ext uri="{909E8E84-426E-40dd-AFC4-6F175D3DCCD1}">
-              <a14:hiddenFill xmlns:a14="http://schemas.microsoft.com/office/drawing/2010/main" xmlns="">
+              <a14:hiddenFill xmlns="" xmlns:a14="http://schemas.microsoft.com/office/drawing/2010/main">
                 <a:solidFill>
                   <a:srgbClr val="FFFFFF"/>
                 </a:solidFill>
@@ -9071,7 +9073,7 @@
               </a:ln>
               <a:extLst>
                 <a:ext uri="{91240B29-F687-4f45-9708-019B960494DF}">
-                  <a14:hiddenLine xmlns:a14="http://schemas.microsoft.com/office/drawing/2010/main" xmlns="" w="9525">
+                  <a14:hiddenLine xmlns="" xmlns:a14="http://schemas.microsoft.com/office/drawing/2010/main" w="9525">
                     <a:solidFill>
                       <a:srgbClr val="000000"/>
                     </a:solidFill>
@@ -9161,7 +9163,7 @@
               </a:ln>
               <a:extLst>
                 <a:ext uri="{91240B29-F687-4f45-9708-019B960494DF}">
-                  <a14:hiddenLine xmlns:a14="http://schemas.microsoft.com/office/drawing/2010/main" xmlns="" w="9525">
+                  <a14:hiddenLine xmlns="" xmlns:a14="http://schemas.microsoft.com/office/drawing/2010/main" w="9525">
                     <a:solidFill>
                       <a:srgbClr val="000000"/>
                     </a:solidFill>
@@ -9251,7 +9253,7 @@
               </a:ln>
               <a:extLst>
                 <a:ext uri="{91240B29-F687-4f45-9708-019B960494DF}">
-                  <a14:hiddenLine xmlns:a14="http://schemas.microsoft.com/office/drawing/2010/main" xmlns="" w="9525">
+                  <a14:hiddenLine xmlns="" xmlns:a14="http://schemas.microsoft.com/office/drawing/2010/main" w="9525">
                     <a:solidFill>
                       <a:srgbClr val="000000"/>
                     </a:solidFill>
@@ -9313,7 +9315,7 @@
               </a:ln>
               <a:extLst>
                 <a:ext uri="{91240B29-F687-4f45-9708-019B960494DF}">
-                  <a14:hiddenLine xmlns:a14="http://schemas.microsoft.com/office/drawing/2010/main" xmlns="" w="9525">
+                  <a14:hiddenLine xmlns="" xmlns:a14="http://schemas.microsoft.com/office/drawing/2010/main" w="9525">
                     <a:solidFill>
                       <a:srgbClr val="000000"/>
                     </a:solidFill>
@@ -9403,7 +9405,7 @@
               </a:ln>
               <a:extLst>
                 <a:ext uri="{91240B29-F687-4f45-9708-019B960494DF}">
-                  <a14:hiddenLine xmlns:a14="http://schemas.microsoft.com/office/drawing/2010/main" xmlns="" w="9525">
+                  <a14:hiddenLine xmlns="" xmlns:a14="http://schemas.microsoft.com/office/drawing/2010/main" w="9525">
                     <a:solidFill>
                       <a:srgbClr val="000000"/>
                     </a:solidFill>
@@ -9465,7 +9467,7 @@
               </a:ln>
               <a:extLst>
                 <a:ext uri="{91240B29-F687-4f45-9708-019B960494DF}">
-                  <a14:hiddenLine xmlns:a14="http://schemas.microsoft.com/office/drawing/2010/main" xmlns="" w="9525">
+                  <a14:hiddenLine xmlns="" xmlns:a14="http://schemas.microsoft.com/office/drawing/2010/main" w="9525">
                     <a:solidFill>
                       <a:srgbClr val="000000"/>
                     </a:solidFill>
@@ -9527,7 +9529,7 @@
               </a:ln>
               <a:extLst>
                 <a:ext uri="{91240B29-F687-4f45-9708-019B960494DF}">
-                  <a14:hiddenLine xmlns:a14="http://schemas.microsoft.com/office/drawing/2010/main" xmlns="" w="9525">
+                  <a14:hiddenLine xmlns="" xmlns:a14="http://schemas.microsoft.com/office/drawing/2010/main" w="9525">
                     <a:solidFill>
                       <a:srgbClr val="000000"/>
                     </a:solidFill>
@@ -9617,7 +9619,7 @@
               </a:ln>
               <a:extLst>
                 <a:ext uri="{91240B29-F687-4f45-9708-019B960494DF}">
-                  <a14:hiddenLine xmlns:a14="http://schemas.microsoft.com/office/drawing/2010/main" xmlns="" w="9525">
+                  <a14:hiddenLine xmlns="" xmlns:a14="http://schemas.microsoft.com/office/drawing/2010/main" w="9525">
                     <a:solidFill>
                       <a:srgbClr val="000000"/>
                     </a:solidFill>
@@ -9707,7 +9709,7 @@
               </a:ln>
               <a:extLst>
                 <a:ext uri="{91240B29-F687-4f45-9708-019B960494DF}">
-                  <a14:hiddenLine xmlns:a14="http://schemas.microsoft.com/office/drawing/2010/main" xmlns="" w="9525">
+                  <a14:hiddenLine xmlns="" xmlns:a14="http://schemas.microsoft.com/office/drawing/2010/main" w="9525">
                     <a:solidFill>
                       <a:srgbClr val="000000"/>
                     </a:solidFill>
@@ -9769,7 +9771,7 @@
               </a:ln>
               <a:extLst>
                 <a:ext uri="{91240B29-F687-4f45-9708-019B960494DF}">
-                  <a14:hiddenLine xmlns:a14="http://schemas.microsoft.com/office/drawing/2010/main" xmlns="" w="9525">
+                  <a14:hiddenLine xmlns="" xmlns:a14="http://schemas.microsoft.com/office/drawing/2010/main" w="9525">
                     <a:solidFill>
                       <a:srgbClr val="000000"/>
                     </a:solidFill>
@@ -9879,7 +9881,7 @@
               </a:ln>
               <a:extLst>
                 <a:ext uri="{91240B29-F687-4f45-9708-019B960494DF}">
-                  <a14:hiddenLine xmlns:a14="http://schemas.microsoft.com/office/drawing/2010/main" xmlns="" w="9525">
+                  <a14:hiddenLine xmlns="" xmlns:a14="http://schemas.microsoft.com/office/drawing/2010/main" w="9525">
                     <a:solidFill>
                       <a:srgbClr val="000000"/>
                     </a:solidFill>
@@ -9963,7 +9965,7 @@
               </a:ln>
               <a:extLst>
                 <a:ext uri="{91240B29-F687-4f45-9708-019B960494DF}">
-                  <a14:hiddenLine xmlns:a14="http://schemas.microsoft.com/office/drawing/2010/main" xmlns="" w="9525">
+                  <a14:hiddenLine xmlns="" xmlns:a14="http://schemas.microsoft.com/office/drawing/2010/main" w="9525">
                     <a:solidFill>
                       <a:srgbClr val="000000"/>
                     </a:solidFill>
@@ -10025,7 +10027,7 @@
               </a:ln>
               <a:extLst>
                 <a:ext uri="{91240B29-F687-4f45-9708-019B960494DF}">
-                  <a14:hiddenLine xmlns:a14="http://schemas.microsoft.com/office/drawing/2010/main" xmlns="" w="9525">
+                  <a14:hiddenLine xmlns="" xmlns:a14="http://schemas.microsoft.com/office/drawing/2010/main" w="9525">
                     <a:solidFill>
                       <a:srgbClr val="000000"/>
                     </a:solidFill>
@@ -10087,7 +10089,7 @@
               </a:ln>
               <a:extLst>
                 <a:ext uri="{91240B29-F687-4f45-9708-019B960494DF}">
-                  <a14:hiddenLine xmlns:a14="http://schemas.microsoft.com/office/drawing/2010/main" xmlns="" w="9525">
+                  <a14:hiddenLine xmlns="" xmlns:a14="http://schemas.microsoft.com/office/drawing/2010/main" w="9525">
                     <a:solidFill>
                       <a:srgbClr val="000000"/>
                     </a:solidFill>
@@ -10177,7 +10179,7 @@
               </a:ln>
               <a:extLst>
                 <a:ext uri="{91240B29-F687-4f45-9708-019B960494DF}">
-                  <a14:hiddenLine xmlns:a14="http://schemas.microsoft.com/office/drawing/2010/main" xmlns="" w="9525">
+                  <a14:hiddenLine xmlns="" xmlns:a14="http://schemas.microsoft.com/office/drawing/2010/main" w="9525">
                     <a:solidFill>
                       <a:srgbClr val="000000"/>
                     </a:solidFill>
@@ -10211,7 +10213,7 @@
               </a:ln>
               <a:extLst>
                 <a:ext uri="{91240B29-F687-4f45-9708-019B960494DF}">
-                  <a14:hiddenLine xmlns:a14="http://schemas.microsoft.com/office/drawing/2010/main" xmlns="" w="9525">
+                  <a14:hiddenLine xmlns="" xmlns:a14="http://schemas.microsoft.com/office/drawing/2010/main" w="9525">
                     <a:solidFill>
                       <a:srgbClr val="000000"/>
                     </a:solidFill>
@@ -10276,7 +10278,7 @@
               </a:ln>
               <a:extLst>
                 <a:ext uri="{91240B29-F687-4f45-9708-019B960494DF}">
-                  <a14:hiddenLine xmlns:a14="http://schemas.microsoft.com/office/drawing/2010/main" xmlns="" w="9525">
+                  <a14:hiddenLine xmlns="" xmlns:a14="http://schemas.microsoft.com/office/drawing/2010/main" w="9525">
                     <a:solidFill>
                       <a:srgbClr val="000000"/>
                     </a:solidFill>
@@ -10366,7 +10368,7 @@
               </a:ln>
               <a:extLst>
                 <a:ext uri="{91240B29-F687-4f45-9708-019B960494DF}">
-                  <a14:hiddenLine xmlns:a14="http://schemas.microsoft.com/office/drawing/2010/main" xmlns="" w="9525">
+                  <a14:hiddenLine xmlns="" xmlns:a14="http://schemas.microsoft.com/office/drawing/2010/main" w="9525">
                     <a:solidFill>
                       <a:srgbClr val="000000"/>
                     </a:solidFill>
@@ -10428,7 +10430,7 @@
               </a:ln>
               <a:extLst>
                 <a:ext uri="{91240B29-F687-4f45-9708-019B960494DF}">
-                  <a14:hiddenLine xmlns:a14="http://schemas.microsoft.com/office/drawing/2010/main" xmlns="" w="9525">
+                  <a14:hiddenLine xmlns="" xmlns:a14="http://schemas.microsoft.com/office/drawing/2010/main" w="9525">
                     <a:solidFill>
                       <a:srgbClr val="000000"/>
                     </a:solidFill>
@@ -10518,7 +10520,7 @@
               </a:ln>
               <a:extLst>
                 <a:ext uri="{91240B29-F687-4f45-9708-019B960494DF}">
-                  <a14:hiddenLine xmlns:a14="http://schemas.microsoft.com/office/drawing/2010/main" xmlns="" w="9525">
+                  <a14:hiddenLine xmlns="" xmlns:a14="http://schemas.microsoft.com/office/drawing/2010/main" w="9525">
                     <a:solidFill>
                       <a:srgbClr val="000000"/>
                     </a:solidFill>
@@ -10583,7 +10585,7 @@
               </a:ln>
               <a:extLst>
                 <a:ext uri="{91240B29-F687-4f45-9708-019B960494DF}">
-                  <a14:hiddenLine xmlns:a14="http://schemas.microsoft.com/office/drawing/2010/main" xmlns="" w="9525">
+                  <a14:hiddenLine xmlns="" xmlns:a14="http://schemas.microsoft.com/office/drawing/2010/main" w="9525">
                     <a:solidFill>
                       <a:srgbClr val="000000"/>
                     </a:solidFill>
@@ -10645,7 +10647,7 @@
               </a:ln>
               <a:extLst>
                 <a:ext uri="{91240B29-F687-4f45-9708-019B960494DF}">
-                  <a14:hiddenLine xmlns:a14="http://schemas.microsoft.com/office/drawing/2010/main" xmlns="" w="9525">
+                  <a14:hiddenLine xmlns="" xmlns:a14="http://schemas.microsoft.com/office/drawing/2010/main" w="9525">
                     <a:solidFill>
                       <a:srgbClr val="000000"/>
                     </a:solidFill>
@@ -10735,7 +10737,7 @@
               </a:ln>
               <a:extLst>
                 <a:ext uri="{91240B29-F687-4f45-9708-019B960494DF}">
-                  <a14:hiddenLine xmlns:a14="http://schemas.microsoft.com/office/drawing/2010/main" xmlns="" w="9525">
+                  <a14:hiddenLine xmlns="" xmlns:a14="http://schemas.microsoft.com/office/drawing/2010/main" w="9525">
                     <a:solidFill>
                       <a:srgbClr val="000000"/>
                     </a:solidFill>
@@ -10825,7 +10827,7 @@
               </a:ln>
               <a:extLst>
                 <a:ext uri="{91240B29-F687-4f45-9708-019B960494DF}">
-                  <a14:hiddenLine xmlns:a14="http://schemas.microsoft.com/office/drawing/2010/main" xmlns="" w="9525">
+                  <a14:hiddenLine xmlns="" xmlns:a14="http://schemas.microsoft.com/office/drawing/2010/main" w="9525">
                     <a:solidFill>
                       <a:srgbClr val="000000"/>
                     </a:solidFill>
@@ -10890,7 +10892,7 @@
               </a:ln>
               <a:extLst>
                 <a:ext uri="{91240B29-F687-4f45-9708-019B960494DF}">
-                  <a14:hiddenLine xmlns:a14="http://schemas.microsoft.com/office/drawing/2010/main" xmlns="" w="9525">
+                  <a14:hiddenLine xmlns="" xmlns:a14="http://schemas.microsoft.com/office/drawing/2010/main" w="9525">
                     <a:solidFill>
                       <a:srgbClr val="000000"/>
                     </a:solidFill>
@@ -11010,7 +11012,7 @@
               </a:ln>
               <a:extLst>
                 <a:ext uri="{91240B29-F687-4f45-9708-019B960494DF}">
-                  <a14:hiddenLine xmlns:a14="http://schemas.microsoft.com/office/drawing/2010/main" xmlns="" w="9525">
+                  <a14:hiddenLine xmlns="" xmlns:a14="http://schemas.microsoft.com/office/drawing/2010/main" w="9525">
                     <a:solidFill>
                       <a:srgbClr val="000000"/>
                     </a:solidFill>
@@ -11108,7 +11110,7 @@
               </a:ln>
               <a:extLst>
                 <a:ext uri="{91240B29-F687-4f45-9708-019B960494DF}">
-                  <a14:hiddenLine xmlns:a14="http://schemas.microsoft.com/office/drawing/2010/main" xmlns="" w="9525">
+                  <a14:hiddenLine xmlns="" xmlns:a14="http://schemas.microsoft.com/office/drawing/2010/main" w="9525">
                     <a:solidFill>
                       <a:srgbClr val="000000"/>
                     </a:solidFill>
@@ -11223,7 +11225,7 @@
               </a:ln>
               <a:extLst>
                 <a:ext uri="{91240B29-F687-4f45-9708-019B960494DF}">
-                  <a14:hiddenLine xmlns:a14="http://schemas.microsoft.com/office/drawing/2010/main" xmlns="" w="9525">
+                  <a14:hiddenLine xmlns="" xmlns:a14="http://schemas.microsoft.com/office/drawing/2010/main" w="9525">
                     <a:solidFill>
                       <a:srgbClr val="000000"/>
                     </a:solidFill>
@@ -11313,7 +11315,7 @@
               </a:ln>
               <a:extLst>
                 <a:ext uri="{91240B29-F687-4f45-9708-019B960494DF}">
-                  <a14:hiddenLine xmlns:a14="http://schemas.microsoft.com/office/drawing/2010/main" xmlns="" w="9525">
+                  <a14:hiddenLine xmlns="" xmlns:a14="http://schemas.microsoft.com/office/drawing/2010/main" w="9525">
                     <a:solidFill>
                       <a:srgbClr val="000000"/>
                     </a:solidFill>
@@ -11378,7 +11380,7 @@
               </a:ln>
               <a:extLst>
                 <a:ext uri="{91240B29-F687-4f45-9708-019B960494DF}">
-                  <a14:hiddenLine xmlns:a14="http://schemas.microsoft.com/office/drawing/2010/main" xmlns="" w="9525">
+                  <a14:hiddenLine xmlns="" xmlns:a14="http://schemas.microsoft.com/office/drawing/2010/main" w="9525">
                     <a:solidFill>
                       <a:srgbClr val="000000"/>
                     </a:solidFill>
@@ -11468,7 +11470,7 @@
               </a:ln>
               <a:extLst>
                 <a:ext uri="{91240B29-F687-4f45-9708-019B960494DF}">
-                  <a14:hiddenLine xmlns:a14="http://schemas.microsoft.com/office/drawing/2010/main" xmlns="" w="9525">
+                  <a14:hiddenLine xmlns="" xmlns:a14="http://schemas.microsoft.com/office/drawing/2010/main" w="9525">
                     <a:solidFill>
                       <a:srgbClr val="000000"/>
                     </a:solidFill>
@@ -11536,7 +11538,7 @@
               </a:ln>
               <a:extLst>
                 <a:ext uri="{91240B29-F687-4f45-9708-019B960494DF}">
-                  <a14:hiddenLine xmlns:a14="http://schemas.microsoft.com/office/drawing/2010/main" xmlns="" w="9525">
+                  <a14:hiddenLine xmlns="" xmlns:a14="http://schemas.microsoft.com/office/drawing/2010/main" w="9525">
                     <a:solidFill>
                       <a:srgbClr val="000000"/>
                     </a:solidFill>
@@ -11626,7 +11628,7 @@
               </a:ln>
               <a:extLst>
                 <a:ext uri="{91240B29-F687-4f45-9708-019B960494DF}">
-                  <a14:hiddenLine xmlns:a14="http://schemas.microsoft.com/office/drawing/2010/main" xmlns="" w="9525">
+                  <a14:hiddenLine xmlns="" xmlns:a14="http://schemas.microsoft.com/office/drawing/2010/main" w="9525">
                     <a:solidFill>
                       <a:srgbClr val="000000"/>
                     </a:solidFill>
@@ -11694,7 +11696,7 @@
               </a:ln>
               <a:extLst>
                 <a:ext uri="{91240B29-F687-4f45-9708-019B960494DF}">
-                  <a14:hiddenLine xmlns:a14="http://schemas.microsoft.com/office/drawing/2010/main" xmlns="" w="9525">
+                  <a14:hiddenLine xmlns="" xmlns:a14="http://schemas.microsoft.com/office/drawing/2010/main" w="9525">
                     <a:solidFill>
                       <a:srgbClr val="000000"/>
                     </a:solidFill>
@@ -11784,7 +11786,7 @@
               </a:ln>
               <a:extLst>
                 <a:ext uri="{91240B29-F687-4f45-9708-019B960494DF}">
-                  <a14:hiddenLine xmlns:a14="http://schemas.microsoft.com/office/drawing/2010/main" xmlns="" w="9525">
+                  <a14:hiddenLine xmlns="" xmlns:a14="http://schemas.microsoft.com/office/drawing/2010/main" w="9525">
                     <a:solidFill>
                       <a:srgbClr val="000000"/>
                     </a:solidFill>
@@ -11818,7 +11820,7 @@
               </a:ln>
               <a:extLst>
                 <a:ext uri="{91240B29-F687-4f45-9708-019B960494DF}">
-                  <a14:hiddenLine xmlns:a14="http://schemas.microsoft.com/office/drawing/2010/main" xmlns="" w="9525">
+                  <a14:hiddenLine xmlns="" xmlns:a14="http://schemas.microsoft.com/office/drawing/2010/main" w="9525">
                     <a:solidFill>
                       <a:srgbClr val="000000"/>
                     </a:solidFill>
@@ -11959,7 +11961,7 @@
             <a:fld id="{48A87A34-81AB-432B-8DAE-1953F412C126}" type="datetimeFigureOut">
               <a:rPr lang="en-US" dirty="0"/>
               <a:pPr/>
-              <a:t>10/1/2019</a:t>
+              <a:t>10/2/2019</a:t>
             </a:fld>
             <a:endParaRPr lang="en-US" dirty="0"/>
           </a:p>
@@ -13310,6 +13312,36 @@
           </a:p>
         </p:txBody>
       </p:sp>
+      <p:pic>
+        <p:nvPicPr>
+          <p:cNvPr id="4" name="Picture 3">
+            <a:extLst>
+              <a:ext uri="{FF2B5EF4-FFF2-40B4-BE49-F238E27FC236}">
+                <a16:creationId xmlns:a16="http://schemas.microsoft.com/office/drawing/2014/main" id="{3CEF6B8C-2DA8-4A45-8E22-A029920D69A1}"/>
+              </a:ext>
+            </a:extLst>
+          </p:cNvPr>
+          <p:cNvPicPr>
+            <a:picLocks noChangeAspect="1"/>
+          </p:cNvPicPr>
+          <p:nvPr/>
+        </p:nvPicPr>
+        <p:blipFill>
+          <a:blip r:embed="rId2"/>
+          <a:stretch>
+            <a:fillRect/>
+          </a:stretch>
+        </p:blipFill>
+        <p:spPr>
+          <a:xfrm>
+            <a:off x="1680277" y="3629739"/>
+            <a:ext cx="8828267" cy="3044230"/>
+          </a:xfrm>
+          <a:prstGeom prst="rect">
+            <a:avLst/>
+          </a:prstGeom>
+        </p:spPr>
+      </p:pic>
     </p:spTree>
     <p:extLst>
       <p:ext uri="{BB962C8B-B14F-4D97-AF65-F5344CB8AC3E}">
@@ -14514,6 +14546,42 @@
             <a:pPr lvl="1"/>
             <a:r>
               <a:rPr lang="en-US" dirty="0"/>
+              <a:t>Local: </a:t>
+            </a:r>
+          </a:p>
+          <a:p>
+            <a:pPr lvl="2"/>
+            <a:r>
+              <a:rPr lang="en-US" dirty="0"/>
+              <a:t>switch to the branch you want to merge to</a:t>
+            </a:r>
+          </a:p>
+          <a:p>
+            <a:pPr lvl="2"/>
+            <a:r>
+              <a:rPr lang="en-US" dirty="0"/>
+              <a:t>‘git merge &lt;</a:t>
+            </a:r>
+            <a:r>
+              <a:rPr lang="en-US" dirty="0" err="1"/>
+              <a:t>branch_to_merge</a:t>
+            </a:r>
+            <a:r>
+              <a:rPr lang="en-US" dirty="0"/>
+              <a:t>&gt;’</a:t>
+            </a:r>
+          </a:p>
+          <a:p>
+            <a:pPr lvl="1"/>
+            <a:r>
+              <a:rPr lang="en-US" dirty="0"/>
+              <a:t>Remote Repo: </a:t>
+            </a:r>
+          </a:p>
+          <a:p>
+            <a:pPr lvl="2"/>
+            <a:r>
+              <a:rPr lang="en-US" dirty="0"/>
               <a:t>‘git push &lt;alias&gt; &lt;</a:t>
             </a:r>
             <a:r>
@@ -14531,6 +14599,103 @@
     <p:extLst>
       <p:ext uri="{BB962C8B-B14F-4D97-AF65-F5344CB8AC3E}">
         <p14:creationId xmlns:p14="http://schemas.microsoft.com/office/powerpoint/2010/main" val="2444424653"/>
+      </p:ext>
+    </p:extLst>
+  </p:cSld>
+  <p:clrMapOvr>
+    <a:masterClrMapping/>
+  </p:clrMapOvr>
+</p:sld>
+</file>
+
+<file path=ppt/slides/slide29.xml><?xml version="1.0" encoding="utf-8"?>
+<p:sld xmlns:a="http://schemas.openxmlformats.org/drawingml/2006/main" xmlns:r="http://schemas.openxmlformats.org/officeDocument/2006/relationships" xmlns:p="http://schemas.openxmlformats.org/presentationml/2006/main">
+  <p:cSld>
+    <p:spTree>
+      <p:nvGrpSpPr>
+        <p:cNvPr id="1" name=""/>
+        <p:cNvGrpSpPr/>
+        <p:nvPr/>
+      </p:nvGrpSpPr>
+      <p:grpSpPr>
+        <a:xfrm>
+          <a:off x="0" y="0"/>
+          <a:ext cx="0" cy="0"/>
+          <a:chOff x="0" y="0"/>
+          <a:chExt cx="0" cy="0"/>
+        </a:xfrm>
+      </p:grpSpPr>
+      <p:sp>
+        <p:nvSpPr>
+          <p:cNvPr id="2" name="Title 1">
+            <a:extLst>
+              <a:ext uri="{FF2B5EF4-FFF2-40B4-BE49-F238E27FC236}">
+                <a16:creationId xmlns:a16="http://schemas.microsoft.com/office/drawing/2014/main" id="{0DD82C84-092D-400E-8261-D507A95F52FE}"/>
+              </a:ext>
+            </a:extLst>
+          </p:cNvPr>
+          <p:cNvSpPr>
+            <a:spLocks noGrp="1"/>
+          </p:cNvSpPr>
+          <p:nvPr>
+            <p:ph type="title"/>
+          </p:nvPr>
+        </p:nvSpPr>
+        <p:spPr/>
+        <p:txBody>
+          <a:bodyPr/>
+          <a:lstStyle/>
+          <a:p>
+            <a:r>
+              <a:rPr lang="en-US" dirty="0"/>
+              <a:t>Updating the Master Branch</a:t>
+            </a:r>
+          </a:p>
+        </p:txBody>
+      </p:sp>
+      <p:sp>
+        <p:nvSpPr>
+          <p:cNvPr id="3" name="Content Placeholder 2">
+            <a:extLst>
+              <a:ext uri="{FF2B5EF4-FFF2-40B4-BE49-F238E27FC236}">
+                <a16:creationId xmlns:a16="http://schemas.microsoft.com/office/drawing/2014/main" id="{1C697DC7-E06A-41D8-AF9E-A9D60FB4D6D9}"/>
+              </a:ext>
+            </a:extLst>
+          </p:cNvPr>
+          <p:cNvSpPr>
+            <a:spLocks noGrp="1"/>
+          </p:cNvSpPr>
+          <p:nvPr>
+            <p:ph idx="1"/>
+          </p:nvPr>
+        </p:nvSpPr>
+        <p:spPr/>
+        <p:txBody>
+          <a:bodyPr/>
+          <a:lstStyle/>
+          <a:p>
+            <a:r>
+              <a:rPr lang="en-US" dirty="0"/>
+              <a:t>Merging Remote Branch</a:t>
+            </a:r>
+          </a:p>
+          <a:p>
+            <a:pPr lvl="1"/>
+            <a:r>
+              <a:rPr lang="en-US" dirty="0"/>
+              <a:t>Add and commit files to local branch</a:t>
+            </a:r>
+          </a:p>
+          <a:p>
+            <a:pPr lvl="1"/>
+            <a:endParaRPr lang="en-US" dirty="0"/>
+          </a:p>
+        </p:txBody>
+      </p:sp>
+    </p:spTree>
+    <p:extLst>
+      <p:ext uri="{BB962C8B-B14F-4D97-AF65-F5344CB8AC3E}">
+        <p14:creationId xmlns:p14="http://schemas.microsoft.com/office/powerpoint/2010/main" val="963816948"/>
       </p:ext>
     </p:extLst>
   </p:cSld>
@@ -14638,6 +14803,100 @@
     <p:extLst>
       <p:ext uri="{BB962C8B-B14F-4D97-AF65-F5344CB8AC3E}">
         <p14:creationId xmlns:p14="http://schemas.microsoft.com/office/powerpoint/2010/main" val="3740517897"/>
+      </p:ext>
+    </p:extLst>
+  </p:cSld>
+  <p:clrMapOvr>
+    <a:masterClrMapping/>
+  </p:clrMapOvr>
+</p:sld>
+</file>
+
+<file path=ppt/slides/slide30.xml><?xml version="1.0" encoding="utf-8"?>
+<p:sld xmlns:a="http://schemas.openxmlformats.org/drawingml/2006/main" xmlns:r="http://schemas.openxmlformats.org/officeDocument/2006/relationships" xmlns:p="http://schemas.openxmlformats.org/presentationml/2006/main">
+  <p:cSld>
+    <p:spTree>
+      <p:nvGrpSpPr>
+        <p:cNvPr id="1" name=""/>
+        <p:cNvGrpSpPr/>
+        <p:nvPr/>
+      </p:nvGrpSpPr>
+      <p:grpSpPr>
+        <a:xfrm>
+          <a:off x="0" y="0"/>
+          <a:ext cx="0" cy="0"/>
+          <a:chOff x="0" y="0"/>
+          <a:chExt cx="0" cy="0"/>
+        </a:xfrm>
+      </p:grpSpPr>
+      <p:sp>
+        <p:nvSpPr>
+          <p:cNvPr id="2" name="Title 1">
+            <a:extLst>
+              <a:ext uri="{FF2B5EF4-FFF2-40B4-BE49-F238E27FC236}">
+                <a16:creationId xmlns:a16="http://schemas.microsoft.com/office/drawing/2014/main" id="{0DD82C84-092D-400E-8261-D507A95F52FE}"/>
+              </a:ext>
+            </a:extLst>
+          </p:cNvPr>
+          <p:cNvSpPr>
+            <a:spLocks noGrp="1"/>
+          </p:cNvSpPr>
+          <p:nvPr>
+            <p:ph type="title"/>
+          </p:nvPr>
+        </p:nvSpPr>
+        <p:spPr/>
+        <p:txBody>
+          <a:bodyPr/>
+          <a:lstStyle/>
+          <a:p>
+            <a:r>
+              <a:rPr lang="en-US" dirty="0"/>
+              <a:t>Useful Commands</a:t>
+            </a:r>
+          </a:p>
+        </p:txBody>
+      </p:sp>
+      <p:sp>
+        <p:nvSpPr>
+          <p:cNvPr id="3" name="Content Placeholder 2">
+            <a:extLst>
+              <a:ext uri="{FF2B5EF4-FFF2-40B4-BE49-F238E27FC236}">
+                <a16:creationId xmlns:a16="http://schemas.microsoft.com/office/drawing/2014/main" id="{1C697DC7-E06A-41D8-AF9E-A9D60FB4D6D9}"/>
+              </a:ext>
+            </a:extLst>
+          </p:cNvPr>
+          <p:cNvSpPr>
+            <a:spLocks noGrp="1"/>
+          </p:cNvSpPr>
+          <p:nvPr>
+            <p:ph idx="1"/>
+          </p:nvPr>
+        </p:nvSpPr>
+        <p:spPr/>
+        <p:txBody>
+          <a:bodyPr/>
+          <a:lstStyle/>
+          <a:p>
+            <a:r>
+              <a:rPr lang="en-US" dirty="0"/>
+              <a:t>Get files in a branch: ‘git ls-tree -r --name-only &lt;</a:t>
+            </a:r>
+            <a:r>
+              <a:rPr lang="en-US" dirty="0" err="1"/>
+              <a:t>name_of_branch</a:t>
+            </a:r>
+            <a:r>
+              <a:rPr lang="en-US" dirty="0"/>
+              <a:t>&gt;’</a:t>
+            </a:r>
+          </a:p>
+        </p:txBody>
+      </p:sp>
+    </p:spTree>
+    <p:extLst>
+      <p:ext uri="{BB962C8B-B14F-4D97-AF65-F5344CB8AC3E}">
+        <p14:creationId xmlns:p14="http://schemas.microsoft.com/office/powerpoint/2010/main" val="3430056922"/>
       </p:ext>
     </p:extLst>
   </p:cSld>
@@ -14821,12 +15080,8 @@
           <a:p>
             <a:pPr lvl="1"/>
             <a:r>
-              <a:rPr lang="en-US"/>
-              <a:t>Branch - A </a:t>
-            </a:r>
-            <a:r>
               <a:rPr lang="en-US" dirty="0"/>
-              <a:t>copy of the current codebase commit, made to add changes</a:t>
+              <a:t>Branch - A copy of the current codebase commit, made to add changes</a:t>
             </a:r>
           </a:p>
           <a:p>

</xml_diff>